<commit_message>
convert image correction workflow to powershell
</commit_message>
<xml_diff>
--- a/documents/Sample Workflow Dependency.pptx
+++ b/documents/Sample Workflow Dependency.pptx
@@ -7,7 +7,9 @@
   <p:sldIdLst>
     <p:sldId id="259" r:id="rId2"/>
     <p:sldId id="261" r:id="rId3"/>
-    <p:sldId id="262" r:id="rId4"/>
+    <p:sldId id="263" r:id="rId4"/>
+    <p:sldId id="264" r:id="rId5"/>
+    <p:sldId id="262" r:id="rId6"/>
   </p:sldIdLst>
   <p:sldSz cx="18288000" cy="9144000"/>
   <p:notesSz cx="6858000" cy="9144000"/>
@@ -245,7 +247,7 @@
           <a:p>
             <a:fld id="{CB8393A8-4562-4F50-B742-6E29655ED728}" type="datetimeFigureOut">
               <a:rPr lang="en-US" smtClean="0"/>
-              <a:t>5/25/2021</a:t>
+              <a:t>7/26/2021</a:t>
             </a:fld>
             <a:endParaRPr lang="en-US"/>
           </a:p>
@@ -415,7 +417,7 @@
           <a:p>
             <a:fld id="{CB8393A8-4562-4F50-B742-6E29655ED728}" type="datetimeFigureOut">
               <a:rPr lang="en-US" smtClean="0"/>
-              <a:t>5/25/2021</a:t>
+              <a:t>7/26/2021</a:t>
             </a:fld>
             <a:endParaRPr lang="en-US"/>
           </a:p>
@@ -595,7 +597,7 @@
           <a:p>
             <a:fld id="{CB8393A8-4562-4F50-B742-6E29655ED728}" type="datetimeFigureOut">
               <a:rPr lang="en-US" smtClean="0"/>
-              <a:t>5/25/2021</a:t>
+              <a:t>7/26/2021</a:t>
             </a:fld>
             <a:endParaRPr lang="en-US"/>
           </a:p>
@@ -765,7 +767,7 @@
           <a:p>
             <a:fld id="{CB8393A8-4562-4F50-B742-6E29655ED728}" type="datetimeFigureOut">
               <a:rPr lang="en-US" smtClean="0"/>
-              <a:t>5/25/2021</a:t>
+              <a:t>7/26/2021</a:t>
             </a:fld>
             <a:endParaRPr lang="en-US"/>
           </a:p>
@@ -1011,7 +1013,7 @@
           <a:p>
             <a:fld id="{CB8393A8-4562-4F50-B742-6E29655ED728}" type="datetimeFigureOut">
               <a:rPr lang="en-US" smtClean="0"/>
-              <a:t>5/25/2021</a:t>
+              <a:t>7/26/2021</a:t>
             </a:fld>
             <a:endParaRPr lang="en-US"/>
           </a:p>
@@ -1243,7 +1245,7 @@
           <a:p>
             <a:fld id="{CB8393A8-4562-4F50-B742-6E29655ED728}" type="datetimeFigureOut">
               <a:rPr lang="en-US" smtClean="0"/>
-              <a:t>5/25/2021</a:t>
+              <a:t>7/26/2021</a:t>
             </a:fld>
             <a:endParaRPr lang="en-US"/>
           </a:p>
@@ -1610,7 +1612,7 @@
           <a:p>
             <a:fld id="{CB8393A8-4562-4F50-B742-6E29655ED728}" type="datetimeFigureOut">
               <a:rPr lang="en-US" smtClean="0"/>
-              <a:t>5/25/2021</a:t>
+              <a:t>7/26/2021</a:t>
             </a:fld>
             <a:endParaRPr lang="en-US"/>
           </a:p>
@@ -1728,7 +1730,7 @@
           <a:p>
             <a:fld id="{CB8393A8-4562-4F50-B742-6E29655ED728}" type="datetimeFigureOut">
               <a:rPr lang="en-US" smtClean="0"/>
-              <a:t>5/25/2021</a:t>
+              <a:t>7/26/2021</a:t>
             </a:fld>
             <a:endParaRPr lang="en-US"/>
           </a:p>
@@ -1823,7 +1825,7 @@
           <a:p>
             <a:fld id="{CB8393A8-4562-4F50-B742-6E29655ED728}" type="datetimeFigureOut">
               <a:rPr lang="en-US" smtClean="0"/>
-              <a:t>5/25/2021</a:t>
+              <a:t>7/26/2021</a:t>
             </a:fld>
             <a:endParaRPr lang="en-US"/>
           </a:p>
@@ -2100,7 +2102,7 @@
           <a:p>
             <a:fld id="{CB8393A8-4562-4F50-B742-6E29655ED728}" type="datetimeFigureOut">
               <a:rPr lang="en-US" smtClean="0"/>
-              <a:t>5/25/2021</a:t>
+              <a:t>7/26/2021</a:t>
             </a:fld>
             <a:endParaRPr lang="en-US"/>
           </a:p>
@@ -2357,7 +2359,7 @@
           <a:p>
             <a:fld id="{CB8393A8-4562-4F50-B742-6E29655ED728}" type="datetimeFigureOut">
               <a:rPr lang="en-US" smtClean="0"/>
-              <a:t>5/25/2021</a:t>
+              <a:t>7/26/2021</a:t>
             </a:fld>
             <a:endParaRPr lang="en-US"/>
           </a:p>
@@ -2570,7 +2572,7 @@
           <a:p>
             <a:fld id="{CB8393A8-4562-4F50-B742-6E29655ED728}" type="datetimeFigureOut">
               <a:rPr lang="en-US" smtClean="0"/>
-              <a:t>5/25/2021</a:t>
+              <a:t>7/26/2021</a:t>
             </a:fld>
             <a:endParaRPr lang="en-US"/>
           </a:p>
@@ -8742,20 +8744,19 @@
         <p:nvCxnSpPr>
           <p:cNvPr id="538" name="Curved Connector 537"/>
           <p:cNvCxnSpPr>
-            <a:stCxn id="279" idx="3"/>
+            <a:stCxn id="230" idx="2"/>
             <a:endCxn id="277" idx="0"/>
           </p:cNvCxnSpPr>
           <p:nvPr/>
         </p:nvCxnSpPr>
         <p:spPr>
-          <a:xfrm flipH="1">
-            <a:off x="3292701" y="1982979"/>
-            <a:ext cx="581884" cy="2997344"/>
+          <a:xfrm rot="16200000" flipH="1">
+            <a:off x="2600111" y="4287733"/>
+            <a:ext cx="1089758" cy="295422"/>
           </a:xfrm>
-          <a:prstGeom prst="curvedConnector4">
+          <a:prstGeom prst="curvedConnector3">
             <a:avLst>
-              <a:gd name="adj1" fmla="val -39286"/>
-              <a:gd name="adj2" fmla="val 53011"/>
+              <a:gd name="adj1" fmla="val 50000"/>
             </a:avLst>
           </a:prstGeom>
           <a:ln>
@@ -11344,6 +11345,168 @@
 </file>
 
 <file path=ppt/slides/slide3.xml><?xml version="1.0" encoding="utf-8"?>
+<p:sld xmlns:a="http://schemas.openxmlformats.org/drawingml/2006/main" xmlns:r="http://schemas.openxmlformats.org/officeDocument/2006/relationships" xmlns:p="http://schemas.openxmlformats.org/presentationml/2006/main">
+  <p:cSld>
+    <p:spTree>
+      <p:nvGrpSpPr>
+        <p:cNvPr id="1" name=""/>
+        <p:cNvGrpSpPr/>
+        <p:nvPr/>
+      </p:nvGrpSpPr>
+      <p:grpSpPr>
+        <a:xfrm>
+          <a:off x="0" y="0"/>
+          <a:ext cx="0" cy="0"/>
+          <a:chOff x="0" y="0"/>
+          <a:chExt cx="0" cy="0"/>
+        </a:xfrm>
+      </p:grpSpPr>
+      <p:sp>
+        <p:nvSpPr>
+          <p:cNvPr id="3" name="TextBox 2"/>
+          <p:cNvSpPr txBox="1"/>
+          <p:nvPr/>
+        </p:nvSpPr>
+        <p:spPr>
+          <a:xfrm>
+            <a:off x="3489158" y="2057400"/>
+            <a:ext cx="8049126" cy="1477328"/>
+          </a:xfrm>
+          <a:prstGeom prst="rect">
+            <a:avLst/>
+          </a:prstGeom>
+          <a:noFill/>
+        </p:spPr>
+        <p:txBody>
+          <a:bodyPr wrap="square" rtlCol="0">
+            <a:spAutoFit/>
+          </a:bodyPr>
+          <a:lstStyle/>
+          <a:p>
+            <a:r>
+              <a:rPr lang="en-US" dirty="0" err="1"/>
+              <a:t>a</a:t>
+            </a:r>
+            <a:r>
+              <a:rPr lang="en-US" dirty="0" err="1" smtClean="0"/>
+              <a:t>stropath</a:t>
+            </a:r>
+            <a:endParaRPr lang="en-US" dirty="0" smtClean="0"/>
+          </a:p>
+          <a:p>
+            <a:r>
+              <a:rPr lang="en-US" dirty="0"/>
+              <a:t>	</a:t>
+            </a:r>
+            <a:r>
+              <a:rPr lang="en-US" dirty="0" smtClean="0"/>
+              <a:t>- workflows (i.e. scans, </a:t>
+            </a:r>
+            <a:r>
+              <a:rPr lang="en-US" dirty="0" err="1" smtClean="0"/>
+              <a:t>hpfs</a:t>
+            </a:r>
+            <a:r>
+              <a:rPr lang="en-US" dirty="0" smtClean="0"/>
+              <a:t>, slides, samples)</a:t>
+            </a:r>
+          </a:p>
+          <a:p>
+            <a:r>
+              <a:rPr lang="en-US" dirty="0" smtClean="0"/>
+              <a:t>	</a:t>
+            </a:r>
+            <a:r>
+              <a:rPr lang="en-US" dirty="0"/>
+              <a:t>	</a:t>
+            </a:r>
+            <a:r>
+              <a:rPr lang="en-US" dirty="0" smtClean="0"/>
+              <a:t>- modules (i.e. flatfield, warping, </a:t>
+            </a:r>
+            <a:r>
+              <a:rPr lang="en-US" dirty="0" err="1" smtClean="0"/>
+              <a:t>imagecorrection</a:t>
+            </a:r>
+            <a:r>
+              <a:rPr lang="en-US" dirty="0" smtClean="0"/>
+              <a:t>, </a:t>
+            </a:r>
+            <a:r>
+              <a:rPr lang="en-US" dirty="0" err="1" smtClean="0"/>
+              <a:t>vminform</a:t>
+            </a:r>
+            <a:r>
+              <a:rPr lang="en-US" dirty="0" smtClean="0"/>
+              <a:t>)</a:t>
+            </a:r>
+          </a:p>
+          <a:p>
+            <a:r>
+              <a:rPr lang="en-US" dirty="0"/>
+              <a:t>	</a:t>
+            </a:r>
+            <a:r>
+              <a:rPr lang="en-US" dirty="0" smtClean="0"/>
+              <a:t>		- code </a:t>
+            </a:r>
+          </a:p>
+          <a:p>
+            <a:r>
+              <a:rPr lang="en-US" dirty="0"/>
+              <a:t>	</a:t>
+            </a:r>
+            <a:r>
+              <a:rPr lang="en-US" dirty="0" smtClean="0"/>
+              <a:t>- tools ( i.e. Utilities, Shared)</a:t>
+            </a:r>
+          </a:p>
+        </p:txBody>
+      </p:sp>
+    </p:spTree>
+    <p:extLst>
+      <p:ext uri="{BB962C8B-B14F-4D97-AF65-F5344CB8AC3E}">
+        <p14:creationId xmlns:p14="http://schemas.microsoft.com/office/powerpoint/2010/main" val="2752466965"/>
+      </p:ext>
+    </p:extLst>
+  </p:cSld>
+  <p:clrMapOvr>
+    <a:masterClrMapping/>
+  </p:clrMapOvr>
+</p:sld>
+</file>
+
+<file path=ppt/slides/slide4.xml><?xml version="1.0" encoding="utf-8"?>
+<p:sld xmlns:a="http://schemas.openxmlformats.org/drawingml/2006/main" xmlns:r="http://schemas.openxmlformats.org/officeDocument/2006/relationships" xmlns:p="http://schemas.openxmlformats.org/presentationml/2006/main">
+  <p:cSld>
+    <p:spTree>
+      <p:nvGrpSpPr>
+        <p:cNvPr id="1" name=""/>
+        <p:cNvGrpSpPr/>
+        <p:nvPr/>
+      </p:nvGrpSpPr>
+      <p:grpSpPr>
+        <a:xfrm>
+          <a:off x="0" y="0"/>
+          <a:ext cx="0" cy="0"/>
+          <a:chOff x="0" y="0"/>
+          <a:chExt cx="0" cy="0"/>
+        </a:xfrm>
+      </p:grpSpPr>
+    </p:spTree>
+    <p:extLst>
+      <p:ext uri="{BB962C8B-B14F-4D97-AF65-F5344CB8AC3E}">
+        <p14:creationId xmlns:p14="http://schemas.microsoft.com/office/powerpoint/2010/main" val="2436221213"/>
+      </p:ext>
+    </p:extLst>
+  </p:cSld>
+  <p:clrMapOvr>
+    <a:masterClrMapping/>
+  </p:clrMapOvr>
+</p:sld>
+</file>
+
+<file path=ppt/slides/slide5.xml><?xml version="1.0" encoding="utf-8"?>
 <p:sld xmlns:a="http://schemas.openxmlformats.org/drawingml/2006/main" xmlns:r="http://schemas.openxmlformats.org/officeDocument/2006/relationships" xmlns:p="http://schemas.openxmlformats.org/presentationml/2006/main">
   <p:cSld>
     <p:spTree>

</xml_diff>